<commit_message>
Update OWASP Top 10 for LLM 2025 articles with improved formatting and clarity
</commit_message>
<xml_diff>
--- a/pptx/template.pptx
+++ b/pptx/template.pptx
@@ -212,7 +212,7 @@
           <a:p>
             <a:fld id="{0F9C1CCF-B725-44A7-AA57-5E433BD85C9F}" type="datetimeFigureOut">
               <a:rPr lang="en-US" smtClean="0"/>
-              <a:t>3/21/25</a:t>
+              <a:t>3/24/25</a:t>
             </a:fld>
             <a:endParaRPr lang="en-US"/>
           </a:p>
@@ -865,7 +865,7 @@
           <a:p>
             <a:fld id="{241EB5C9-1307-BA42-ABA2-0BC069CD8E7F}" type="datetimeFigureOut">
               <a:rPr lang="en-US" smtClean="0"/>
-              <a:t>3/21/25</a:t>
+              <a:t>3/24/25</a:t>
             </a:fld>
             <a:endParaRPr lang="en-US"/>
           </a:p>
@@ -1033,7 +1033,7 @@
           <a:p>
             <a:fld id="{241EB5C9-1307-BA42-ABA2-0BC069CD8E7F}" type="datetimeFigureOut">
               <a:rPr lang="en-US" smtClean="0"/>
-              <a:t>3/21/25</a:t>
+              <a:t>3/24/25</a:t>
             </a:fld>
             <a:endParaRPr lang="en-US"/>
           </a:p>
@@ -1211,7 +1211,7 @@
           <a:p>
             <a:fld id="{241EB5C9-1307-BA42-ABA2-0BC069CD8E7F}" type="datetimeFigureOut">
               <a:rPr lang="en-US" smtClean="0"/>
-              <a:t>3/21/25</a:t>
+              <a:t>3/24/25</a:t>
             </a:fld>
             <a:endParaRPr lang="en-US"/>
           </a:p>
@@ -3463,7 +3463,7 @@
           <a:p>
             <a:fld id="{241EB5C9-1307-BA42-ABA2-0BC069CD8E7F}" type="datetimeFigureOut">
               <a:rPr lang="en-US" smtClean="0"/>
-              <a:t>3/21/25</a:t>
+              <a:t>3/24/25</a:t>
             </a:fld>
             <a:endParaRPr lang="en-US"/>
           </a:p>
@@ -4212,7 +4212,7 @@
           <a:p>
             <a:fld id="{241EB5C9-1307-BA42-ABA2-0BC069CD8E7F}" type="datetimeFigureOut">
               <a:rPr lang="en-US" smtClean="0"/>
-              <a:t>3/21/25</a:t>
+              <a:t>3/24/25</a:t>
             </a:fld>
             <a:endParaRPr lang="en-US"/>
           </a:p>
@@ -4974,7 +4974,7 @@
           <a:p>
             <a:fld id="{241EB5C9-1307-BA42-ABA2-0BC069CD8E7F}" type="datetimeFigureOut">
               <a:rPr lang="en-US" smtClean="0"/>
-              <a:t>3/21/25</a:t>
+              <a:t>3/24/25</a:t>
             </a:fld>
             <a:endParaRPr lang="en-US"/>
           </a:p>
@@ -5240,7 +5240,7 @@
           <a:p>
             <a:fld id="{241EB5C9-1307-BA42-ABA2-0BC069CD8E7F}" type="datetimeFigureOut">
               <a:rPr lang="en-US" smtClean="0"/>
-              <a:t>3/21/25</a:t>
+              <a:t>3/24/25</a:t>
             </a:fld>
             <a:endParaRPr lang="en-US"/>
           </a:p>
@@ -5525,7 +5525,7 @@
           <a:p>
             <a:fld id="{241EB5C9-1307-BA42-ABA2-0BC069CD8E7F}" type="datetimeFigureOut">
               <a:rPr lang="en-US" smtClean="0"/>
-              <a:t>3/21/25</a:t>
+              <a:t>3/24/25</a:t>
             </a:fld>
             <a:endParaRPr lang="en-US"/>
           </a:p>
@@ -5944,7 +5944,7 @@
           <a:p>
             <a:fld id="{241EB5C9-1307-BA42-ABA2-0BC069CD8E7F}" type="datetimeFigureOut">
               <a:rPr lang="en-US" smtClean="0"/>
-              <a:t>3/21/25</a:t>
+              <a:t>3/24/25</a:t>
             </a:fld>
             <a:endParaRPr lang="en-US"/>
           </a:p>
@@ -6061,7 +6061,7 @@
           <a:p>
             <a:fld id="{241EB5C9-1307-BA42-ABA2-0BC069CD8E7F}" type="datetimeFigureOut">
               <a:rPr lang="en-US" smtClean="0"/>
-              <a:t>3/21/25</a:t>
+              <a:t>3/24/25</a:t>
             </a:fld>
             <a:endParaRPr lang="en-US"/>
           </a:p>
@@ -6156,7 +6156,7 @@
           <a:p>
             <a:fld id="{241EB5C9-1307-BA42-ABA2-0BC069CD8E7F}" type="datetimeFigureOut">
               <a:rPr lang="en-US" smtClean="0"/>
-              <a:t>3/21/25</a:t>
+              <a:t>3/24/25</a:t>
             </a:fld>
             <a:endParaRPr lang="en-US"/>
           </a:p>
@@ -6431,7 +6431,7 @@
           <a:p>
             <a:fld id="{241EB5C9-1307-BA42-ABA2-0BC069CD8E7F}" type="datetimeFigureOut">
               <a:rPr lang="en-US" smtClean="0"/>
-              <a:t>3/21/25</a:t>
+              <a:t>3/24/25</a:t>
             </a:fld>
             <a:endParaRPr lang="en-US"/>
           </a:p>
@@ -6683,7 +6683,7 @@
           <a:p>
             <a:fld id="{241EB5C9-1307-BA42-ABA2-0BC069CD8E7F}" type="datetimeFigureOut">
               <a:rPr lang="en-US" smtClean="0"/>
-              <a:t>3/21/25</a:t>
+              <a:t>3/24/25</a:t>
             </a:fld>
             <a:endParaRPr lang="en-US"/>
           </a:p>
@@ -6894,7 +6894,7 @@
           <a:p>
             <a:fld id="{241EB5C9-1307-BA42-ABA2-0BC069CD8E7F}" type="datetimeFigureOut">
               <a:rPr lang="en-US" smtClean="0"/>
-              <a:t>3/21/25</a:t>
+              <a:t>3/24/25</a:t>
             </a:fld>
             <a:endParaRPr lang="en-US"/>
           </a:p>
@@ -8203,7 +8203,7 @@
             <a:spLocks noGrp="1"/>
           </p:cNvSpPr>
           <p:nvPr>
-            <p:ph type="title"/>
+            <p:ph type="ctrTitle"/>
           </p:nvPr>
         </p:nvSpPr>
         <p:spPr/>
@@ -8220,12 +8220,18 @@
       </p:sp>
       <p:sp>
         <p:nvSpPr>
-          <p:cNvPr id="3" name="Text Placeholder 2"/>
-          <p:cNvSpPr>
-            <a:spLocks noGrp="1"/>
-          </p:cNvSpPr>
-          <p:nvPr>
-            <p:ph type="body" idx="1"/>
+          <p:cNvPr id="6" name="Subtitle 5">
+            <a:extLst>
+              <a:ext uri="{FF2B5EF4-FFF2-40B4-BE49-F238E27FC236}">
+                <a16:creationId xmlns:a16="http://schemas.microsoft.com/office/drawing/2014/main" id="{C9A3B2D5-9D38-3791-2189-87729B8BAE6D}"/>
+              </a:ext>
+            </a:extLst>
+          </p:cNvPr>
+          <p:cNvSpPr>
+            <a:spLocks noGrp="1"/>
+          </p:cNvSpPr>
+          <p:nvPr>
+            <p:ph type="subTitle" idx="1"/>
           </p:nvPr>
         </p:nvSpPr>
         <p:spPr/>

</xml_diff>

<commit_message>
Add articles on MCP Server and MCP Security with detailed insights
</commit_message>
<xml_diff>
--- a/pptx/template.pptx
+++ b/pptx/template.pptx
@@ -863,9 +863,9 @@
           <a:bodyPr/>
           <a:lstStyle/>
           <a:p>
-            <a:fld id="{241EB5C9-1307-BA42-ABA2-0BC069CD8E7F}" type="datetimeFigureOut">
-              <a:rPr lang="en-US" smtClean="0"/>
-              <a:t>3/24/25</a:t>
+            <a:fld id="{0BD5A289-D3C7-5742-9425-E092DD1BBE45}" type="datetime1">
+              <a:rPr lang="fr-FR" smtClean="0"/>
+              <a:t>24/03/2025</a:t>
             </a:fld>
             <a:endParaRPr lang="en-US"/>
           </a:p>
@@ -886,7 +886,10 @@
           <a:bodyPr/>
           <a:lstStyle/>
           <a:p>
-            <a:endParaRPr lang="en-US"/>
+            <a:r>
+              <a:rPr lang="en-US"/>
+              <a:t>(c) S.Gioria (OWASP) 2025</a:t>
+            </a:r>
           </a:p>
         </p:txBody>
       </p:sp>
@@ -1031,9 +1034,9 @@
           <a:bodyPr/>
           <a:lstStyle/>
           <a:p>
-            <a:fld id="{241EB5C9-1307-BA42-ABA2-0BC069CD8E7F}" type="datetimeFigureOut">
-              <a:rPr lang="en-US" smtClean="0"/>
-              <a:t>3/24/25</a:t>
+            <a:fld id="{4E897390-92FF-D041-B438-E5A5EE32F553}" type="datetime1">
+              <a:rPr lang="fr-FR" smtClean="0"/>
+              <a:t>24/03/2025</a:t>
             </a:fld>
             <a:endParaRPr lang="en-US"/>
           </a:p>
@@ -1054,7 +1057,10 @@
           <a:bodyPr/>
           <a:lstStyle/>
           <a:p>
-            <a:endParaRPr lang="en-US"/>
+            <a:r>
+              <a:rPr lang="en-US"/>
+              <a:t>(c) S.Gioria (OWASP) 2025</a:t>
+            </a:r>
           </a:p>
         </p:txBody>
       </p:sp>
@@ -1209,9 +1215,9 @@
           <a:bodyPr/>
           <a:lstStyle/>
           <a:p>
-            <a:fld id="{241EB5C9-1307-BA42-ABA2-0BC069CD8E7F}" type="datetimeFigureOut">
-              <a:rPr lang="en-US" smtClean="0"/>
-              <a:t>3/24/25</a:t>
+            <a:fld id="{43F018FC-5F1D-0B48-89A3-0E38F07843A0}" type="datetime1">
+              <a:rPr lang="fr-FR" smtClean="0"/>
+              <a:t>24/03/2025</a:t>
             </a:fld>
             <a:endParaRPr lang="en-US"/>
           </a:p>
@@ -1232,7 +1238,10 @@
           <a:bodyPr/>
           <a:lstStyle/>
           <a:p>
-            <a:endParaRPr lang="en-US"/>
+            <a:r>
+              <a:rPr lang="en-US"/>
+              <a:t>(c) S.Gioria (OWASP) 2025</a:t>
+            </a:r>
           </a:p>
         </p:txBody>
       </p:sp>
@@ -1708,7 +1717,10 @@
             </a:lvl1pPr>
           </a:lstStyle>
           <a:p>
-            <a:endParaRPr lang="en-US"/>
+            <a:r>
+              <a:rPr lang="en-US"/>
+              <a:t>(c) S.Gioria (OWASP) 2025</a:t>
+            </a:r>
           </a:p>
         </p:txBody>
       </p:sp>
@@ -1960,7 +1972,10 @@
             </a:lvl1pPr>
           </a:lstStyle>
           <a:p>
-            <a:endParaRPr lang="en-US"/>
+            <a:r>
+              <a:rPr lang="en-US"/>
+              <a:t>(c) S.Gioria (OWASP) 2025</a:t>
+            </a:r>
           </a:p>
         </p:txBody>
       </p:sp>
@@ -2252,7 +2267,10 @@
             </a:lvl1pPr>
           </a:lstStyle>
           <a:p>
-            <a:endParaRPr lang="en-US"/>
+            <a:r>
+              <a:rPr lang="en-US"/>
+              <a:t>(c) S.Gioria (OWASP) 2025</a:t>
+            </a:r>
           </a:p>
         </p:txBody>
       </p:sp>
@@ -2601,7 +2619,10 @@
             </a:lvl1pPr>
           </a:lstStyle>
           <a:p>
-            <a:endParaRPr lang="en-US"/>
+            <a:r>
+              <a:rPr lang="en-US"/>
+              <a:t>(c) S.Gioria (OWASP) 2025</a:t>
+            </a:r>
           </a:p>
         </p:txBody>
       </p:sp>
@@ -2848,7 +2869,10 @@
             </a:lvl1pPr>
           </a:lstStyle>
           <a:p>
-            <a:endParaRPr lang="en-US"/>
+            <a:r>
+              <a:rPr lang="en-US"/>
+              <a:t>(c) S.Gioria (OWASP) 2025</a:t>
+            </a:r>
           </a:p>
         </p:txBody>
       </p:sp>
@@ -3227,7 +3251,10 @@
             </a:lvl1pPr>
           </a:lstStyle>
           <a:p>
-            <a:endParaRPr lang="en-US"/>
+            <a:r>
+              <a:rPr lang="en-US"/>
+              <a:t>(c) S.Gioria (OWASP) 2025</a:t>
+            </a:r>
           </a:p>
         </p:txBody>
       </p:sp>
@@ -3461,9 +3488,9 @@
           <a:bodyPr/>
           <a:lstStyle/>
           <a:p>
-            <a:fld id="{241EB5C9-1307-BA42-ABA2-0BC069CD8E7F}" type="datetimeFigureOut">
-              <a:rPr lang="en-US" smtClean="0"/>
-              <a:t>3/24/25</a:t>
+            <a:fld id="{0B781631-1672-BF49-B5E3-8E80C29B302C}" type="datetime1">
+              <a:rPr lang="fr-FR" smtClean="0"/>
+              <a:t>24/03/2025</a:t>
             </a:fld>
             <a:endParaRPr lang="en-US"/>
           </a:p>
@@ -3484,7 +3511,10 @@
           <a:bodyPr/>
           <a:lstStyle/>
           <a:p>
-            <a:endParaRPr lang="en-US"/>
+            <a:r>
+              <a:rPr lang="en-US"/>
+              <a:t>(c) S.Gioria (OWASP) 2025</a:t>
+            </a:r>
           </a:p>
         </p:txBody>
       </p:sp>
@@ -4210,9 +4240,9 @@
           <a:bodyPr/>
           <a:lstStyle/>
           <a:p>
-            <a:fld id="{241EB5C9-1307-BA42-ABA2-0BC069CD8E7F}" type="datetimeFigureOut">
-              <a:rPr lang="en-US" smtClean="0"/>
-              <a:t>3/24/25</a:t>
+            <a:fld id="{29C0B5BC-8FF6-F44C-B322-FA558B9E95EB}" type="datetime1">
+              <a:rPr lang="fr-FR" smtClean="0"/>
+              <a:t>24/03/2025</a:t>
             </a:fld>
             <a:endParaRPr lang="en-US"/>
           </a:p>
@@ -4239,7 +4269,10 @@
           <a:bodyPr/>
           <a:lstStyle/>
           <a:p>
-            <a:endParaRPr lang="en-US"/>
+            <a:r>
+              <a:rPr lang="en-US"/>
+              <a:t>(c) S.Gioria (OWASP) 2025</a:t>
+            </a:r>
           </a:p>
         </p:txBody>
       </p:sp>
@@ -4424,7 +4457,10 @@
           <a:bodyPr/>
           <a:lstStyle/>
           <a:p>
-            <a:endParaRPr lang="en-US"/>
+            <a:r>
+              <a:rPr lang="en-US"/>
+              <a:t>(c) S.Gioria (OWASP) 2025</a:t>
+            </a:r>
           </a:p>
         </p:txBody>
       </p:sp>
@@ -4827,7 +4863,10 @@
           <a:bodyPr/>
           <a:lstStyle/>
           <a:p>
-            <a:endParaRPr lang="en-US"/>
+            <a:r>
+              <a:rPr lang="en-US"/>
+              <a:t>(c) S.Gioria (OWASP) 2025</a:t>
+            </a:r>
           </a:p>
         </p:txBody>
       </p:sp>
@@ -4972,9 +5011,9 @@
           <a:bodyPr/>
           <a:lstStyle/>
           <a:p>
-            <a:fld id="{241EB5C9-1307-BA42-ABA2-0BC069CD8E7F}" type="datetimeFigureOut">
-              <a:rPr lang="en-US" smtClean="0"/>
-              <a:t>3/24/25</a:t>
+            <a:fld id="{52AD1C19-383C-284A-BE7B-3F602FDDDB0B}" type="datetime1">
+              <a:rPr lang="fr-FR" smtClean="0"/>
+              <a:t>24/03/2025</a:t>
             </a:fld>
             <a:endParaRPr lang="en-US"/>
           </a:p>
@@ -4995,7 +5034,10 @@
           <a:bodyPr/>
           <a:lstStyle/>
           <a:p>
-            <a:endParaRPr lang="en-US"/>
+            <a:r>
+              <a:rPr lang="en-US"/>
+              <a:t>(c) S.Gioria (OWASP) 2025</a:t>
+            </a:r>
           </a:p>
         </p:txBody>
       </p:sp>
@@ -5238,9 +5280,9 @@
           <a:bodyPr/>
           <a:lstStyle/>
           <a:p>
-            <a:fld id="{241EB5C9-1307-BA42-ABA2-0BC069CD8E7F}" type="datetimeFigureOut">
-              <a:rPr lang="en-US" smtClean="0"/>
-              <a:t>3/24/25</a:t>
+            <a:fld id="{C201A344-E875-A04B-841A-D2F2BB1E51E7}" type="datetime1">
+              <a:rPr lang="fr-FR" smtClean="0"/>
+              <a:t>24/03/2025</a:t>
             </a:fld>
             <a:endParaRPr lang="en-US"/>
           </a:p>
@@ -5261,7 +5303,10 @@
           <a:bodyPr/>
           <a:lstStyle/>
           <a:p>
-            <a:endParaRPr lang="en-US"/>
+            <a:r>
+              <a:rPr lang="en-US"/>
+              <a:t>(c) S.Gioria (OWASP) 2025</a:t>
+            </a:r>
           </a:p>
         </p:txBody>
       </p:sp>
@@ -5523,9 +5568,9 @@
           <a:bodyPr/>
           <a:lstStyle/>
           <a:p>
-            <a:fld id="{241EB5C9-1307-BA42-ABA2-0BC069CD8E7F}" type="datetimeFigureOut">
-              <a:rPr lang="en-US" smtClean="0"/>
-              <a:t>3/24/25</a:t>
+            <a:fld id="{0BCBCFA8-C189-954E-BB5A-0D14D4985720}" type="datetime1">
+              <a:rPr lang="fr-FR" smtClean="0"/>
+              <a:t>24/03/2025</a:t>
             </a:fld>
             <a:endParaRPr lang="en-US"/>
           </a:p>
@@ -5546,7 +5591,10 @@
           <a:bodyPr/>
           <a:lstStyle/>
           <a:p>
-            <a:endParaRPr lang="en-US"/>
+            <a:r>
+              <a:rPr lang="en-US"/>
+              <a:t>(c) S.Gioria (OWASP) 2025</a:t>
+            </a:r>
           </a:p>
         </p:txBody>
       </p:sp>
@@ -5942,9 +5990,9 @@
           <a:bodyPr/>
           <a:lstStyle/>
           <a:p>
-            <a:fld id="{241EB5C9-1307-BA42-ABA2-0BC069CD8E7F}" type="datetimeFigureOut">
-              <a:rPr lang="en-US" smtClean="0"/>
-              <a:t>3/24/25</a:t>
+            <a:fld id="{C56B5FB1-E87D-5845-879C-47D0D5356C8B}" type="datetime1">
+              <a:rPr lang="fr-FR" smtClean="0"/>
+              <a:t>24/03/2025</a:t>
             </a:fld>
             <a:endParaRPr lang="en-US"/>
           </a:p>
@@ -5965,7 +6013,10 @@
           <a:bodyPr/>
           <a:lstStyle/>
           <a:p>
-            <a:endParaRPr lang="en-US"/>
+            <a:r>
+              <a:rPr lang="en-US"/>
+              <a:t>(c) S.Gioria (OWASP) 2025</a:t>
+            </a:r>
           </a:p>
         </p:txBody>
       </p:sp>
@@ -6059,9 +6110,9 @@
           <a:bodyPr/>
           <a:lstStyle/>
           <a:p>
-            <a:fld id="{241EB5C9-1307-BA42-ABA2-0BC069CD8E7F}" type="datetimeFigureOut">
-              <a:rPr lang="en-US" smtClean="0"/>
-              <a:t>3/24/25</a:t>
+            <a:fld id="{1A9A83D8-C2FC-9143-AB23-6D4364D1C98A}" type="datetime1">
+              <a:rPr lang="fr-FR" smtClean="0"/>
+              <a:t>24/03/2025</a:t>
             </a:fld>
             <a:endParaRPr lang="en-US"/>
           </a:p>
@@ -6082,7 +6133,10 @@
           <a:bodyPr/>
           <a:lstStyle/>
           <a:p>
-            <a:endParaRPr lang="en-US"/>
+            <a:r>
+              <a:rPr lang="en-US"/>
+              <a:t>(c) S.Gioria (OWASP) 2025</a:t>
+            </a:r>
           </a:p>
         </p:txBody>
       </p:sp>
@@ -6154,9 +6208,9 @@
           <a:bodyPr/>
           <a:lstStyle/>
           <a:p>
-            <a:fld id="{241EB5C9-1307-BA42-ABA2-0BC069CD8E7F}" type="datetimeFigureOut">
-              <a:rPr lang="en-US" smtClean="0"/>
-              <a:t>3/24/25</a:t>
+            <a:fld id="{9ED0C6F0-FAB5-FB46-BB33-27E554DBA755}" type="datetime1">
+              <a:rPr lang="fr-FR" smtClean="0"/>
+              <a:t>24/03/2025</a:t>
             </a:fld>
             <a:endParaRPr lang="en-US"/>
           </a:p>
@@ -6177,7 +6231,10 @@
           <a:bodyPr/>
           <a:lstStyle/>
           <a:p>
-            <a:endParaRPr lang="en-US"/>
+            <a:r>
+              <a:rPr lang="en-US"/>
+              <a:t>(c) S.Gioria (OWASP) 2025</a:t>
+            </a:r>
           </a:p>
         </p:txBody>
       </p:sp>
@@ -6429,9 +6486,9 @@
           <a:bodyPr/>
           <a:lstStyle/>
           <a:p>
-            <a:fld id="{241EB5C9-1307-BA42-ABA2-0BC069CD8E7F}" type="datetimeFigureOut">
-              <a:rPr lang="en-US" smtClean="0"/>
-              <a:t>3/24/25</a:t>
+            <a:fld id="{1E8EDDFB-C761-E84A-AFF5-9242F89ADBAE}" type="datetime1">
+              <a:rPr lang="fr-FR" smtClean="0"/>
+              <a:t>24/03/2025</a:t>
             </a:fld>
             <a:endParaRPr lang="en-US"/>
           </a:p>
@@ -6452,7 +6509,10 @@
           <a:bodyPr/>
           <a:lstStyle/>
           <a:p>
-            <a:endParaRPr lang="en-US"/>
+            <a:r>
+              <a:rPr lang="en-US"/>
+              <a:t>(c) S.Gioria (OWASP) 2025</a:t>
+            </a:r>
           </a:p>
         </p:txBody>
       </p:sp>
@@ -6681,9 +6741,9 @@
           <a:bodyPr/>
           <a:lstStyle/>
           <a:p>
-            <a:fld id="{241EB5C9-1307-BA42-ABA2-0BC069CD8E7F}" type="datetimeFigureOut">
-              <a:rPr lang="en-US" smtClean="0"/>
-              <a:t>3/24/25</a:t>
+            <a:fld id="{98250ED8-6649-864F-A1FC-D32B753E63EE}" type="datetime1">
+              <a:rPr lang="fr-FR" smtClean="0"/>
+              <a:t>24/03/2025</a:t>
             </a:fld>
             <a:endParaRPr lang="en-US"/>
           </a:p>
@@ -6704,7 +6764,10 @@
           <a:bodyPr/>
           <a:lstStyle/>
           <a:p>
-            <a:endParaRPr lang="en-US"/>
+            <a:r>
+              <a:rPr lang="en-US"/>
+              <a:t>(c) S.Gioria (OWASP) 2025</a:t>
+            </a:r>
           </a:p>
         </p:txBody>
       </p:sp>
@@ -6892,9 +6955,9 @@
             </a:lvl1pPr>
           </a:lstStyle>
           <a:p>
-            <a:fld id="{241EB5C9-1307-BA42-ABA2-0BC069CD8E7F}" type="datetimeFigureOut">
-              <a:rPr lang="en-US" smtClean="0"/>
-              <a:t>3/24/25</a:t>
+            <a:fld id="{FF499C46-BE6A-254A-B335-2A092F210F38}" type="datetime1">
+              <a:rPr lang="fr-FR" smtClean="0"/>
+              <a:t>24/03/2025</a:t>
             </a:fld>
             <a:endParaRPr lang="en-US"/>
           </a:p>
@@ -6933,7 +6996,10 @@
             </a:lvl1pPr>
           </a:lstStyle>
           <a:p>
-            <a:endParaRPr lang="en-US"/>
+            <a:r>
+              <a:rPr lang="en-US"/>
+              <a:t>(c) S.Gioria (OWASP) 2025</a:t>
+            </a:r>
           </a:p>
         </p:txBody>
       </p:sp>
@@ -6999,6 +7065,7 @@
     <p:sldLayoutId id="2147483658" r:id="rId10"/>
     <p:sldLayoutId id="2147483659" r:id="rId11"/>
   </p:sldLayoutIdLst>
+  <p:hf hdr="0"/>
   <p:txStyles>
     <p:titleStyle>
       <a:lvl1pPr algn="ctr" defTabSz="342900" rtl="0" eaLnBrk="1" latinLnBrk="0" hangingPunct="1">
@@ -7687,6 +7754,7 @@
     <p:sldLayoutId id="2147483675" r:id="rId15"/>
     <p:sldLayoutId id="2147483676" r:id="rId16"/>
   </p:sldLayoutIdLst>
+  <p:hf hdr="0"/>
   <p:txStyles>
     <p:titleStyle>
       <a:lvl1pPr algn="l" defTabSz="685800" rtl="0" eaLnBrk="1" latinLnBrk="0" hangingPunct="1">
@@ -8149,20 +8217,104 @@
         </p:nvSpPr>
         <p:spPr/>
         <p:txBody>
-          <a:bodyPr/>
+          <a:bodyPr>
+            <a:normAutofit/>
+          </a:bodyPr>
           <a:lstStyle/>
           <a:p>
             <a:pPr marL="0" indent="0">
               <a:buNone/>
             </a:pPr>
             <a:r>
-              <a:rPr lang="en-US" dirty="0"/>
-              <a:t>Hello</a:t>
-            </a:r>
+              <a:rPr lang="en-US" sz="1400" dirty="0"/>
+              <a:t>Hello, world.</a:t>
+            </a:r>
+          </a:p>
+        </p:txBody>
+      </p:sp>
+      <p:sp>
+        <p:nvSpPr>
+          <p:cNvPr id="4" name="Date Placeholder 3">
+            <a:extLst>
+              <a:ext uri="{FF2B5EF4-FFF2-40B4-BE49-F238E27FC236}">
+                <a16:creationId xmlns:a16="http://schemas.microsoft.com/office/drawing/2014/main" id="{F0054FC1-28E6-F145-34B6-1D7194E22C2F}"/>
+              </a:ext>
+            </a:extLst>
+          </p:cNvPr>
+          <p:cNvSpPr>
+            <a:spLocks noGrp="1"/>
+          </p:cNvSpPr>
+          <p:nvPr>
+            <p:ph type="dt" sz="half" idx="10"/>
+          </p:nvPr>
+        </p:nvSpPr>
+        <p:spPr/>
+        <p:txBody>
+          <a:bodyPr/>
+          <a:lstStyle/>
+          <a:p>
+            <a:fld id="{39BD9ECD-06AF-5944-91B3-365254368E36}" type="datetime1">
+              <a:rPr lang="fr-FR" smtClean="0"/>
+              <a:t>24/03/2025</a:t>
+            </a:fld>
+            <a:endParaRPr lang="en-US"/>
+          </a:p>
+        </p:txBody>
+      </p:sp>
+      <p:sp>
+        <p:nvSpPr>
+          <p:cNvPr id="5" name="Footer Placeholder 4">
+            <a:extLst>
+              <a:ext uri="{FF2B5EF4-FFF2-40B4-BE49-F238E27FC236}">
+                <a16:creationId xmlns:a16="http://schemas.microsoft.com/office/drawing/2014/main" id="{3144C4FD-6AF6-FA26-FAA5-761C82684456}"/>
+              </a:ext>
+            </a:extLst>
+          </p:cNvPr>
+          <p:cNvSpPr>
+            <a:spLocks noGrp="1"/>
+          </p:cNvSpPr>
+          <p:nvPr>
+            <p:ph type="ftr" sz="quarter" idx="11"/>
+          </p:nvPr>
+        </p:nvSpPr>
+        <p:spPr/>
+        <p:txBody>
+          <a:bodyPr/>
+          <a:lstStyle/>
+          <a:p>
             <a:r>
               <a:rPr lang="en-US"/>
-              <a:t>, world.</a:t>
-            </a:r>
+              <a:t>(c) S.Gioria (OWASP) 2025</a:t>
+            </a:r>
+          </a:p>
+        </p:txBody>
+      </p:sp>
+      <p:sp>
+        <p:nvSpPr>
+          <p:cNvPr id="6" name="Slide Number Placeholder 5">
+            <a:extLst>
+              <a:ext uri="{FF2B5EF4-FFF2-40B4-BE49-F238E27FC236}">
+                <a16:creationId xmlns:a16="http://schemas.microsoft.com/office/drawing/2014/main" id="{FD894E4E-0B66-A754-B191-D3D5F109DB9E}"/>
+              </a:ext>
+            </a:extLst>
+          </p:cNvPr>
+          <p:cNvSpPr>
+            <a:spLocks noGrp="1"/>
+          </p:cNvSpPr>
+          <p:nvPr>
+            <p:ph type="sldNum" sz="quarter" idx="12"/>
+          </p:nvPr>
+        </p:nvSpPr>
+        <p:spPr/>
+        <p:txBody>
+          <a:bodyPr/>
+          <a:lstStyle/>
+          <a:p>
+            <a:fld id="{C5EF2332-01BF-834F-8236-50238282D533}" type="slidenum">
+              <a:rPr lang="en-US" smtClean="0"/>
+              <a:t>2</a:t>
+            </a:fld>
+            <a:endParaRPr lang="en-US"/>
           </a:p>
         </p:txBody>
       </p:sp>
@@ -8243,6 +8395,92 @@
           </a:p>
         </p:txBody>
       </p:sp>
+      <p:sp>
+        <p:nvSpPr>
+          <p:cNvPr id="3" name="Date Placeholder 2">
+            <a:extLst>
+              <a:ext uri="{FF2B5EF4-FFF2-40B4-BE49-F238E27FC236}">
+                <a16:creationId xmlns:a16="http://schemas.microsoft.com/office/drawing/2014/main" id="{4A7F5980-4652-DF2B-383C-DC7BB25A819E}"/>
+              </a:ext>
+            </a:extLst>
+          </p:cNvPr>
+          <p:cNvSpPr>
+            <a:spLocks noGrp="1"/>
+          </p:cNvSpPr>
+          <p:nvPr>
+            <p:ph type="dt" sz="half" idx="10"/>
+          </p:nvPr>
+        </p:nvSpPr>
+        <p:spPr/>
+        <p:txBody>
+          <a:bodyPr/>
+          <a:lstStyle/>
+          <a:p>
+            <a:fld id="{8FA4B833-1530-DB41-8FBB-85C859958508}" type="datetime1">
+              <a:rPr lang="fr-FR" smtClean="0"/>
+              <a:t>24/03/2025</a:t>
+            </a:fld>
+            <a:endParaRPr lang="en-US"/>
+          </a:p>
+        </p:txBody>
+      </p:sp>
+      <p:sp>
+        <p:nvSpPr>
+          <p:cNvPr id="4" name="Footer Placeholder 3">
+            <a:extLst>
+              <a:ext uri="{FF2B5EF4-FFF2-40B4-BE49-F238E27FC236}">
+                <a16:creationId xmlns:a16="http://schemas.microsoft.com/office/drawing/2014/main" id="{E1445DF4-7297-6AD5-985B-694A477BB25A}"/>
+              </a:ext>
+            </a:extLst>
+          </p:cNvPr>
+          <p:cNvSpPr>
+            <a:spLocks noGrp="1"/>
+          </p:cNvSpPr>
+          <p:nvPr>
+            <p:ph type="ftr" sz="quarter" idx="11"/>
+          </p:nvPr>
+        </p:nvSpPr>
+        <p:spPr/>
+        <p:txBody>
+          <a:bodyPr/>
+          <a:lstStyle/>
+          <a:p>
+            <a:r>
+              <a:rPr lang="en-US"/>
+              <a:t>(c) S.Gioria (OWASP) 2025</a:t>
+            </a:r>
+          </a:p>
+        </p:txBody>
+      </p:sp>
+      <p:sp>
+        <p:nvSpPr>
+          <p:cNvPr id="5" name="Slide Number Placeholder 4">
+            <a:extLst>
+              <a:ext uri="{FF2B5EF4-FFF2-40B4-BE49-F238E27FC236}">
+                <a16:creationId xmlns:a16="http://schemas.microsoft.com/office/drawing/2014/main" id="{7BB2F004-E83E-9606-89BD-3CFAE91D5609}"/>
+              </a:ext>
+            </a:extLst>
+          </p:cNvPr>
+          <p:cNvSpPr>
+            <a:spLocks noGrp="1"/>
+          </p:cNvSpPr>
+          <p:nvPr>
+            <p:ph type="sldNum" sz="quarter" idx="12"/>
+          </p:nvPr>
+        </p:nvSpPr>
+        <p:spPr/>
+        <p:txBody>
+          <a:bodyPr/>
+          <a:lstStyle/>
+          <a:p>
+            <a:fld id="{C5EF2332-01BF-834F-8236-50238282D533}" type="slidenum">
+              <a:rPr lang="en-US" smtClean="0"/>
+              <a:t>3</a:t>
+            </a:fld>
+            <a:endParaRPr lang="en-US"/>
+          </a:p>
+        </p:txBody>
+      </p:sp>
     </p:spTree>
     <p:extLst>
       <p:ext uri="{BB962C8B-B14F-4D97-AF65-F5344CB8AC3E}">
@@ -8347,6 +8585,92 @@
               <a:rPr lang="en-US" dirty="0"/>
               <a:t>Some content on the right.</a:t>
             </a:r>
+          </a:p>
+        </p:txBody>
+      </p:sp>
+      <p:sp>
+        <p:nvSpPr>
+          <p:cNvPr id="2" name="Date Placeholder 1">
+            <a:extLst>
+              <a:ext uri="{FF2B5EF4-FFF2-40B4-BE49-F238E27FC236}">
+                <a16:creationId xmlns:a16="http://schemas.microsoft.com/office/drawing/2014/main" id="{7BDA4BD2-F6CF-0862-47E9-DE2AE5ACBB4B}"/>
+              </a:ext>
+            </a:extLst>
+          </p:cNvPr>
+          <p:cNvSpPr>
+            <a:spLocks noGrp="1"/>
+          </p:cNvSpPr>
+          <p:nvPr>
+            <p:ph type="dt" sz="half" idx="10"/>
+          </p:nvPr>
+        </p:nvSpPr>
+        <p:spPr/>
+        <p:txBody>
+          <a:bodyPr/>
+          <a:lstStyle/>
+          <a:p>
+            <a:fld id="{FDBDA4AE-8A6A-EA40-B8D1-6034D644BB4A}" type="datetime1">
+              <a:rPr lang="fr-FR" smtClean="0"/>
+              <a:t>24/03/2025</a:t>
+            </a:fld>
+            <a:endParaRPr lang="en-US"/>
+          </a:p>
+        </p:txBody>
+      </p:sp>
+      <p:sp>
+        <p:nvSpPr>
+          <p:cNvPr id="3" name="Footer Placeholder 2">
+            <a:extLst>
+              <a:ext uri="{FF2B5EF4-FFF2-40B4-BE49-F238E27FC236}">
+                <a16:creationId xmlns:a16="http://schemas.microsoft.com/office/drawing/2014/main" id="{5395A2AC-6833-197E-395E-DB3C2C1214B7}"/>
+              </a:ext>
+            </a:extLst>
+          </p:cNvPr>
+          <p:cNvSpPr>
+            <a:spLocks noGrp="1"/>
+          </p:cNvSpPr>
+          <p:nvPr>
+            <p:ph type="ftr" sz="quarter" idx="11"/>
+          </p:nvPr>
+        </p:nvSpPr>
+        <p:spPr/>
+        <p:txBody>
+          <a:bodyPr/>
+          <a:lstStyle/>
+          <a:p>
+            <a:r>
+              <a:rPr lang="en-US"/>
+              <a:t>(c) S.Gioria (OWASP) 2025</a:t>
+            </a:r>
+          </a:p>
+        </p:txBody>
+      </p:sp>
+      <p:sp>
+        <p:nvSpPr>
+          <p:cNvPr id="7" name="Slide Number Placeholder 6">
+            <a:extLst>
+              <a:ext uri="{FF2B5EF4-FFF2-40B4-BE49-F238E27FC236}">
+                <a16:creationId xmlns:a16="http://schemas.microsoft.com/office/drawing/2014/main" id="{EB20A0CE-DC5D-456F-250B-F6CACE340BC0}"/>
+              </a:ext>
+            </a:extLst>
+          </p:cNvPr>
+          <p:cNvSpPr>
+            <a:spLocks noGrp="1"/>
+          </p:cNvSpPr>
+          <p:nvPr>
+            <p:ph type="sldNum" sz="quarter" idx="12"/>
+          </p:nvPr>
+        </p:nvSpPr>
+        <p:spPr/>
+        <p:txBody>
+          <a:bodyPr/>
+          <a:lstStyle/>
+          <a:p>
+            <a:fld id="{C5EF2332-01BF-834F-8236-50238282D533}" type="slidenum">
+              <a:rPr lang="en-US" smtClean="0"/>
+              <a:t>4</a:t>
+            </a:fld>
+            <a:endParaRPr lang="en-US"/>
           </a:p>
         </p:txBody>
       </p:sp>

</xml_diff>